<commit_message>
Pequenas modificações no layout da apresentação e geração de um .pdf.
</commit_message>
<xml_diff>
--- a/trabalho 6/apresentacao.pptx
+++ b/trabalho 6/apresentacao.pptx
@@ -11964,6 +11964,75 @@
       </p:graphicFrame>
       <p:sp>
         <p:nvSpPr>
+          <p:cNvPr id="7" name="Espaço Reservado para Texto 6"/>
+          <p:cNvSpPr>
+            <a:spLocks noGrp="1"/>
+          </p:cNvSpPr>
+          <p:nvPr>
+            <p:ph type="body"/>
+          </p:nvPr>
+        </p:nvSpPr>
+        <p:spPr/>
+        <p:txBody>
+          <a:bodyPr/>
+          <a:lstStyle/>
+          <a:p>
+            <a:pPr marL="432000" indent="-323640" algn="just">
+              <a:lnSpc>
+                <a:spcPct val="100000"/>
+              </a:lnSpc>
+              <a:buClr>
+                <a:srgbClr val="000000"/>
+              </a:buClr>
+              <a:buSzPct val="45000"/>
+              <a:buFont typeface="Wingdings" charset="2"/>
+              <a:buChar char=""/>
+            </a:pPr>
+            <a:r>
+              <a:rPr lang="pt-BR" sz="2400" strike="noStrike" spc="-1" dirty="0" smtClean="0">
+                <a:solidFill>
+                  <a:srgbClr val="000000"/>
+                </a:solidFill>
+                <a:uFill>
+                  <a:solidFill>
+                    <a:srgbClr val="FFFFFF"/>
+                  </a:solidFill>
+                </a:uFill>
+                <a:latin typeface="Century Schoolbook" pitchFamily="18" charset="0"/>
+                <a:ea typeface="DejaVu Sans"/>
+              </a:rPr>
+              <a:t>Imagem por </a:t>
+            </a:r>
+            <a:r>
+              <a:rPr lang="pt-BR" sz="2400" strike="noStrike" spc="-1" dirty="0" smtClean="0">
+                <a:solidFill>
+                  <a:srgbClr val="000000"/>
+                </a:solidFill>
+                <a:uFill>
+                  <a:solidFill>
+                    <a:srgbClr val="FFFFFF"/>
+                  </a:solidFill>
+                </a:uFill>
+                <a:latin typeface="Century Schoolbook" pitchFamily="18" charset="0"/>
+              </a:rPr>
+              <a:t>composição das bandas por soma simétrica (Bloch, 1996).</a:t>
+            </a:r>
+            <a:endParaRPr lang="pt-BR" sz="2400" spc="-1" dirty="0" smtClean="0">
+              <a:solidFill>
+                <a:srgbClr val="000000"/>
+              </a:solidFill>
+              <a:uFill>
+                <a:solidFill>
+                  <a:srgbClr val="FFFFFF"/>
+                </a:solidFill>
+              </a:uFill>
+              <a:latin typeface="Century Schoolbook" pitchFamily="18" charset="0"/>
+            </a:endParaRPr>
+          </a:p>
+        </p:txBody>
+      </p:sp>
+      <p:sp>
+        <p:nvSpPr>
           <p:cNvPr id="4" name="Título 3"/>
           <p:cNvSpPr>
             <a:spLocks noGrp="1"/>
@@ -12008,75 +12077,6 @@
               <a:t>Carcinoma</a:t>
             </a:r>
             <a:endParaRPr lang="pt-BR" sz="3000" b="1" dirty="0">
-              <a:latin typeface="Century Schoolbook" pitchFamily="18" charset="0"/>
-            </a:endParaRPr>
-          </a:p>
-        </p:txBody>
-      </p:sp>
-      <p:sp>
-        <p:nvSpPr>
-          <p:cNvPr id="7" name="Espaço Reservado para Texto 6"/>
-          <p:cNvSpPr>
-            <a:spLocks noGrp="1"/>
-          </p:cNvSpPr>
-          <p:nvPr>
-            <p:ph type="body"/>
-          </p:nvPr>
-        </p:nvSpPr>
-        <p:spPr/>
-        <p:txBody>
-          <a:bodyPr/>
-          <a:lstStyle/>
-          <a:p>
-            <a:pPr marL="432000" indent="-323640" algn="just">
-              <a:lnSpc>
-                <a:spcPct val="100000"/>
-              </a:lnSpc>
-              <a:buClr>
-                <a:srgbClr val="000000"/>
-              </a:buClr>
-              <a:buSzPct val="45000"/>
-              <a:buFont typeface="Wingdings" charset="2"/>
-              <a:buChar char=""/>
-            </a:pPr>
-            <a:r>
-              <a:rPr lang="pt-BR" sz="2400" strike="noStrike" spc="-1" dirty="0" smtClean="0">
-                <a:solidFill>
-                  <a:srgbClr val="000000"/>
-                </a:solidFill>
-                <a:uFill>
-                  <a:solidFill>
-                    <a:srgbClr val="FFFFFF"/>
-                  </a:solidFill>
-                </a:uFill>
-                <a:latin typeface="Century Schoolbook" pitchFamily="18" charset="0"/>
-                <a:ea typeface="DejaVu Sans"/>
-              </a:rPr>
-              <a:t>Imagem por </a:t>
-            </a:r>
-            <a:r>
-              <a:rPr lang="pt-BR" sz="2400" strike="noStrike" spc="-1" dirty="0" smtClean="0">
-                <a:solidFill>
-                  <a:srgbClr val="000000"/>
-                </a:solidFill>
-                <a:uFill>
-                  <a:solidFill>
-                    <a:srgbClr val="FFFFFF"/>
-                  </a:solidFill>
-                </a:uFill>
-                <a:latin typeface="Century Schoolbook" pitchFamily="18" charset="0"/>
-              </a:rPr>
-              <a:t>composição das bandas por soma simétrica (Bloch, 1996).</a:t>
-            </a:r>
-            <a:endParaRPr lang="pt-BR" sz="2400" spc="-1" dirty="0" smtClean="0">
-              <a:solidFill>
-                <a:srgbClr val="000000"/>
-              </a:solidFill>
-              <a:uFill>
-                <a:solidFill>
-                  <a:srgbClr val="FFFFFF"/>
-                </a:solidFill>
-              </a:uFill>
               <a:latin typeface="Century Schoolbook" pitchFamily="18" charset="0"/>
             </a:endParaRPr>
           </a:p>
@@ -12126,7 +12126,7 @@
         </p:nvSpPr>
         <p:spPr>
           <a:xfrm>
-            <a:off x="503808" y="1475581"/>
+            <a:off x="503808" y="1547589"/>
             <a:ext cx="9068760" cy="4382280"/>
           </a:xfrm>
         </p:spPr>
@@ -12184,12 +12184,7 @@
             <p:ph type="title"/>
           </p:nvPr>
         </p:nvSpPr>
-        <p:spPr>
-          <a:xfrm>
-            <a:off x="504720" y="303120"/>
-            <a:ext cx="9072000" cy="1028445"/>
-          </a:xfrm>
-        </p:spPr>
+        <p:spPr/>
         <p:txBody>
           <a:bodyPr/>
           <a:lstStyle/>
@@ -13513,7 +13508,7 @@
         </p:nvSpPr>
         <p:spPr>
           <a:xfrm>
-            <a:off x="503808" y="1403573"/>
+            <a:off x="503808" y="1475581"/>
             <a:ext cx="9068760" cy="4382280"/>
           </a:xfrm>
         </p:spPr>
@@ -13571,18 +13566,13 @@
             <p:ph type="title"/>
           </p:nvPr>
         </p:nvSpPr>
-        <p:spPr>
-          <a:xfrm>
-            <a:off x="504720" y="303120"/>
-            <a:ext cx="9072000" cy="1100453"/>
-          </a:xfrm>
-        </p:spPr>
+        <p:spPr/>
         <p:txBody>
           <a:bodyPr/>
           <a:lstStyle/>
           <a:p>
             <a:r>
-              <a:rPr lang="pt-BR" sz="3000" strike="noStrike" spc="-1" dirty="0" smtClean="0">
+              <a:rPr lang="pt-BR" sz="3000" strike="noStrike" spc="-1" smtClean="0">
                 <a:solidFill>
                   <a:srgbClr val="000000"/>
                 </a:solidFill>
@@ -13597,7 +13587,7 @@
               <a:t>RESULTADOS: </a:t>
             </a:r>
             <a:r>
-              <a:rPr lang="pt-BR" sz="3000" b="1" strike="noStrike" spc="-1" dirty="0" err="1" smtClean="0">
+              <a:rPr lang="pt-BR" sz="3000" b="1" strike="noStrike" spc="-1" smtClean="0">
                 <a:solidFill>
                   <a:srgbClr val="000000"/>
                 </a:solidFill>
@@ -13609,37 +13599,7 @@
                 <a:latin typeface="Century Schoolbook" pitchFamily="18" charset="0"/>
                 <a:ea typeface="DejaVu Sans"/>
               </a:rPr>
-              <a:t>Moderate</a:t>
-            </a:r>
-            <a:r>
-              <a:rPr lang="pt-BR" sz="3000" b="1" strike="noStrike" spc="-1" dirty="0" smtClean="0">
-                <a:solidFill>
-                  <a:srgbClr val="000000"/>
-                </a:solidFill>
-                <a:uFill>
-                  <a:solidFill>
-                    <a:srgbClr val="FFFFFF"/>
-                  </a:solidFill>
-                </a:uFill>
-                <a:latin typeface="Century Schoolbook" pitchFamily="18" charset="0"/>
-                <a:ea typeface="DejaVu Sans"/>
-              </a:rPr>
-              <a:t> </a:t>
-            </a:r>
-            <a:r>
-              <a:rPr lang="pt-BR" sz="3000" b="1" strike="noStrike" spc="-1" dirty="0" err="1" smtClean="0">
-                <a:solidFill>
-                  <a:srgbClr val="000000"/>
-                </a:solidFill>
-                <a:uFill>
-                  <a:solidFill>
-                    <a:srgbClr val="FFFFFF"/>
-                  </a:solidFill>
-                </a:uFill>
-                <a:latin typeface="Century Schoolbook" pitchFamily="18" charset="0"/>
-                <a:ea typeface="DejaVu Sans"/>
-              </a:rPr>
-              <a:t>Dysplastic</a:t>
+              <a:t>Moderate Dysplastic</a:t>
             </a:r>
             <a:endParaRPr lang="pt-BR" sz="3000" b="1" dirty="0">
               <a:latin typeface="Century Schoolbook" pitchFamily="18" charset="0"/>
@@ -15491,12 +15451,7 @@
             <p:ph type="title"/>
           </p:nvPr>
         </p:nvSpPr>
-        <p:spPr>
-          <a:xfrm>
-            <a:off x="504720" y="303120"/>
-            <a:ext cx="9072000" cy="1100453"/>
-          </a:xfrm>
-        </p:spPr>
+        <p:spPr/>
         <p:txBody>
           <a:bodyPr/>
           <a:lstStyle/>

</xml_diff>